<commit_message>
Robot Design Lessons added
</commit_message>
<xml_diff>
--- a/translations/en-us/robots/BaseRobot.pptx
+++ b/translations/en-us/robots/BaseRobot.pptx
@@ -12654,7 +12654,15 @@
             <a:pPr algn="ctr"/>
             <a:r>
               <a:rPr lang="en-US" dirty="0" smtClean="0"/>
-              <a:t>ROBOT BUILD LESSON</a:t>
+              <a:t>ROBOT </a:t>
+            </a:r>
+            <a:r>
+              <a:rPr lang="en-US" dirty="0" smtClean="0"/>
+              <a:t>DESIGN </a:t>
+            </a:r>
+            <a:r>
+              <a:rPr lang="en-US" dirty="0" smtClean="0"/>
+              <a:t>LESSON</a:t>
             </a:r>
             <a:endParaRPr lang="en-US" dirty="0"/>
           </a:p>
@@ -12748,7 +12756,7 @@
             </a:pPr>
             <a:r>
               <a:rPr lang="en-US" dirty="0" smtClean="0"/>
-              <a:t>You can use any EV3 robot you wish with EV3Lessons.com. </a:t>
+              <a:t>You can use any EV3 robot you wish with EV3Lessons.com because we teach you program the EV3 regardless of the model you build.  You will just have to modify the challenges to suit your robot. </a:t>
             </a:r>
           </a:p>
           <a:p>
@@ -12776,7 +12784,7 @@
             </a:r>
             <a:r>
               <a:rPr lang="en-US" dirty="0" smtClean="0"/>
-              <a:t> 2.0) and #31313 (</a:t>
+              <a:t>) and #31313 (</a:t>
             </a:r>
             <a:r>
               <a:rPr lang="en-US" dirty="0" err="1" smtClean="0"/>
@@ -12812,17 +12820,6 @@
               <a:rPr lang="en-US" dirty="0" smtClean="0"/>
               <a:t>alternative.</a:t>
             </a:r>
-          </a:p>
-          <a:p>
-            <a:pPr marL="342900" indent="-342900">
-              <a:buFont typeface="Arial" charset="0"/>
-              <a:buChar char="•"/>
-            </a:pPr>
-            <a:r>
-              <a:rPr lang="en-US" dirty="0" smtClean="0"/>
-              <a:t>BUT remember that EV3Lessons.com’s lessons and techniques will work with any robot – just change the solutions to match your robot’s configurations.</a:t>
-            </a:r>
-            <a:endParaRPr lang="en-US" dirty="0"/>
           </a:p>
         </p:txBody>
       </p:sp>
@@ -12928,10 +12925,6 @@
             <a:r>
               <a:rPr lang="en-US" dirty="0" err="1" smtClean="0"/>
               <a:t>DroidBot</a:t>
-            </a:r>
-            <a:r>
-              <a:rPr lang="en-US" dirty="0" smtClean="0"/>
-              <a:t> 2.0</a:t>
             </a:r>
             <a:endParaRPr lang="en-US" dirty="0"/>
           </a:p>
@@ -13380,7 +13373,7 @@
         </p:spPr>
         <p:txBody>
           <a:bodyPr>
-            <a:normAutofit fontScale="92500" lnSpcReduction="20000"/>
+            <a:normAutofit fontScale="85000" lnSpcReduction="10000"/>
           </a:bodyPr>
           <a:lstStyle/>
           <a:p>
@@ -13430,7 +13423,7 @@
             </a:pPr>
             <a:r>
               <a:rPr lang="en-US" dirty="0" smtClean="0"/>
-              <a:t>Build instructions are available on the EV3 Edu software</a:t>
+              <a:t>Build instructions are available on the EV3 Edu software and comes printed with the #45544 kit</a:t>
             </a:r>
           </a:p>
         </p:txBody>
@@ -13497,12 +13490,56 @@
         </p:blipFill>
         <p:spPr>
           <a:xfrm>
-            <a:off x="4787558" y="1880327"/>
-            <a:ext cx="3669825" cy="3067973"/>
+            <a:off x="5328519" y="1213980"/>
+            <a:ext cx="2688140" cy="2247285"/>
           </a:xfrm>
           <a:prstGeom prst="rect">
             <a:avLst/>
           </a:prstGeom>
+        </p:spPr>
+      </p:pic>
+      <p:pic>
+        <p:nvPicPr>
+          <p:cNvPr id="6" name="Picture 5"/>
+          <p:cNvPicPr>
+            <a:picLocks noChangeAspect="1"/>
+          </p:cNvPicPr>
+          <p:nvPr/>
+        </p:nvPicPr>
+        <p:blipFill>
+          <a:blip r:embed="rId3" cstate="print">
+            <a:extLst>
+              <a:ext uri="{28A0092B-C50C-407E-A947-70E740481C1C}">
+                <a14:useLocalDpi xmlns:a14="http://schemas.microsoft.com/office/drawing/2010/main"/>
+              </a:ext>
+            </a:extLst>
+          </a:blip>
+          <a:stretch>
+            <a:fillRect/>
+          </a:stretch>
+        </p:blipFill>
+        <p:spPr>
+          <a:xfrm>
+            <a:off x="5131893" y="3550607"/>
+            <a:ext cx="3325490" cy="2498942"/>
+          </a:xfrm>
+          <a:prstGeom prst="rect">
+            <a:avLst/>
+          </a:prstGeom>
+          <a:ln w="38100" cap="sq">
+            <a:solidFill>
+              <a:srgbClr val="000000"/>
+            </a:solidFill>
+            <a:prstDash val="solid"/>
+            <a:miter lim="800000"/>
+          </a:ln>
+          <a:effectLst>
+            <a:outerShdw blurRad="50800" dist="38100" dir="2700000" algn="tl" rotWithShape="0">
+              <a:srgbClr val="000000">
+                <a:alpha val="43000"/>
+              </a:srgbClr>
+            </a:outerShdw>
+          </a:effectLst>
         </p:spPr>
       </p:pic>
     </p:spTree>
@@ -13626,7 +13663,7 @@
             </a:pPr>
             <a:r>
               <a:rPr lang="en-US" dirty="0" smtClean="0"/>
-              <a:t>A link to this robot is provided on our Robot Designs page</a:t>
+              <a:t>A link to this robot is provided on our Robot Designs page under “Contributed”</a:t>
             </a:r>
             <a:endParaRPr lang="en-US" dirty="0"/>
           </a:p>

</xml_diff>

<commit_message>
Base robot build updated with Enterprise and Discovery
</commit_message>
<xml_diff>
--- a/translations/en-us/robots/BaseRobot.pptx
+++ b/translations/en-us/robots/BaseRobot.pptx
@@ -7,19 +7,18 @@
     <p:sldMasterId id="2147483859" r:id="rId3"/>
   </p:sldMasterIdLst>
   <p:notesMasterIdLst>
-    <p:notesMasterId r:id="rId11"/>
+    <p:notesMasterId r:id="rId10"/>
   </p:notesMasterIdLst>
   <p:handoutMasterIdLst>
-    <p:handoutMasterId r:id="rId12"/>
+    <p:handoutMasterId r:id="rId11"/>
   </p:handoutMasterIdLst>
   <p:sldIdLst>
     <p:sldId id="289" r:id="rId4"/>
     <p:sldId id="275" r:id="rId5"/>
-    <p:sldId id="291" r:id="rId6"/>
-    <p:sldId id="292" r:id="rId7"/>
-    <p:sldId id="290" r:id="rId8"/>
-    <p:sldId id="293" r:id="rId9"/>
-    <p:sldId id="274" r:id="rId10"/>
+    <p:sldId id="294" r:id="rId6"/>
+    <p:sldId id="290" r:id="rId7"/>
+    <p:sldId id="293" r:id="rId8"/>
+    <p:sldId id="274" r:id="rId9"/>
   </p:sldIdLst>
   <p:sldSz cx="9144000" cy="6858000" type="screen4x3"/>
   <p:notesSz cx="6858000" cy="9144000"/>
@@ -219,7 +218,7 @@
           <a:p>
             <a:fld id="{E354B44E-40A3-0E46-B16A-9BF1250A248B}" type="datetimeFigureOut">
               <a:rPr lang="en-US" smtClean="0"/>
-              <a:t>7/5/16</a:t>
+              <a:t>7/14/16</a:t>
             </a:fld>
             <a:endParaRPr lang="en-US"/>
           </a:p>
@@ -385,7 +384,7 @@
           <a:p>
             <a:fld id="{C86AD16C-2DB4-6642-BAD4-9ED973A087A0}" type="datetimeFigureOut">
               <a:rPr lang="en-US" smtClean="0"/>
-              <a:t>7/5/16</a:t>
+              <a:t>7/14/16</a:t>
             </a:fld>
             <a:endParaRPr lang="en-US"/>
           </a:p>
@@ -719,7 +718,7 @@
           <a:p>
             <a:fld id="{1E5BF589-3978-3C45-966B-D7B7A71F2A02}" type="slidenum">
               <a:rPr lang="en-US" smtClean="0"/>
-              <a:t>7</a:t>
+              <a:t>6</a:t>
             </a:fld>
             <a:endParaRPr lang="en-US"/>
           </a:p>
@@ -931,7 +930,7 @@
           <a:p>
             <a:fld id="{4079049D-260D-7341-ACBB-7F6E88B670AF}" type="datetime1">
               <a:rPr lang="en-US" smtClean="0"/>
-              <a:t>7/5/16</a:t>
+              <a:t>7/14/16</a:t>
             </a:fld>
             <a:endParaRPr lang="en-US"/>
           </a:p>
@@ -1530,7 +1529,7 @@
           <a:p>
             <a:fld id="{D23FB13C-50E9-E247-B6CA-7FFE79A5F656}" type="datetime1">
               <a:rPr lang="en-US" smtClean="0"/>
-              <a:t>7/5/16</a:t>
+              <a:t>7/14/16</a:t>
             </a:fld>
             <a:endParaRPr lang="en-US"/>
           </a:p>
@@ -1714,7 +1713,7 @@
           <a:p>
             <a:fld id="{2240301C-C036-B244-8BEA-8C69B4259916}" type="datetime1">
               <a:rPr lang="en-US" smtClean="0"/>
-              <a:t>7/5/16</a:t>
+              <a:t>7/14/16</a:t>
             </a:fld>
             <a:endParaRPr lang="en-US"/>
           </a:p>
@@ -1931,7 +1930,7 @@
           <a:p>
             <a:fld id="{6D3B6815-494D-AC43-9B33-2F9570967BF1}" type="datetime1">
               <a:rPr lang="en-US" smtClean="0"/>
-              <a:t>7/5/16</a:t>
+              <a:t>7/14/16</a:t>
             </a:fld>
             <a:endParaRPr lang="en-US"/>
           </a:p>
@@ -2150,7 +2149,7 @@
           <a:noFill/>
           <a:extLst>
             <a:ext uri="{909E8E84-426E-40dd-AFC4-6F175D3DCCD1}">
-              <a14:hiddenFill xmlns="" xmlns:a14="http://schemas.microsoft.com/office/drawing/2010/main">
+              <a14:hiddenFill xmlns:a14="http://schemas.microsoft.com/office/drawing/2010/main" xmlns="">
                 <a:solidFill>
                   <a:srgbClr val="FFFFFF"/>
                 </a:solidFill>
@@ -3202,7 +3201,7 @@
           <a:p>
             <a:fld id="{8F36B86E-CFB1-CA4E-9DF9-B0CEC6E07421}" type="datetime1">
               <a:rPr lang="en-US" smtClean="0"/>
-              <a:t>7/5/16</a:t>
+              <a:t>7/14/16</a:t>
             </a:fld>
             <a:endParaRPr lang="en-US"/>
           </a:p>
@@ -3475,7 +3474,7 @@
           <a:p>
             <a:fld id="{CEB03A98-E1B0-3440-912D-EBE5F791588D}" type="datetime1">
               <a:rPr lang="en-US" smtClean="0"/>
-              <a:t>7/5/16</a:t>
+              <a:t>7/14/16</a:t>
             </a:fld>
             <a:endParaRPr lang="en-US"/>
           </a:p>
@@ -3780,7 +3779,7 @@
           <a:p>
             <a:fld id="{2AFAA2E9-D72B-AD48-AF1F-52A08EBA4303}" type="datetime1">
               <a:rPr lang="en-US" smtClean="0"/>
-              <a:t>7/5/16</a:t>
+              <a:t>7/14/16</a:t>
             </a:fld>
             <a:endParaRPr lang="en-US"/>
           </a:p>
@@ -4243,7 +4242,7 @@
           <a:p>
             <a:fld id="{962D5479-4DE8-6441-8AD0-9A685ACF12B8}" type="datetime1">
               <a:rPr lang="en-US" smtClean="0"/>
-              <a:t>7/5/16</a:t>
+              <a:t>7/14/16</a:t>
             </a:fld>
             <a:endParaRPr lang="en-US"/>
           </a:p>
@@ -4380,7 +4379,7 @@
           <a:p>
             <a:fld id="{66D21241-F89D-A94C-9EDF-69E3F40ABE0B}" type="datetime1">
               <a:rPr lang="en-US" smtClean="0"/>
-              <a:t>7/5/16</a:t>
+              <a:t>7/14/16</a:t>
             </a:fld>
             <a:endParaRPr lang="en-US"/>
           </a:p>
@@ -4494,7 +4493,7 @@
           <a:p>
             <a:fld id="{D3DC5F3B-56FA-F546-A574-CF6D118384F4}" type="datetime1">
               <a:rPr lang="en-US" smtClean="0"/>
-              <a:t>7/5/16</a:t>
+              <a:t>7/14/16</a:t>
             </a:fld>
             <a:endParaRPr lang="en-US"/>
           </a:p>
@@ -4753,7 +4752,7 @@
           <a:p>
             <a:fld id="{3BC196E9-40E7-7B40-BAB3-173E3286BBA4}" type="datetime1">
               <a:rPr lang="en-US" smtClean="0"/>
-              <a:t>7/5/16</a:t>
+              <a:t>7/14/16</a:t>
             </a:fld>
             <a:endParaRPr lang="en-US"/>
           </a:p>
@@ -4968,7 +4967,7 @@
           <a:p>
             <a:fld id="{2B4934FA-BB7E-FA4B-8587-3422606245F1}" type="datetime1">
               <a:rPr lang="en-US" smtClean="0"/>
-              <a:t>7/5/16</a:t>
+              <a:t>7/14/16</a:t>
             </a:fld>
             <a:endParaRPr lang="en-US"/>
           </a:p>
@@ -5253,7 +5252,7 @@
           <a:p>
             <a:fld id="{36F29019-D865-2D41-8B16-2696D9E9FF36}" type="datetime1">
               <a:rPr lang="en-US" smtClean="0"/>
-              <a:t>7/5/16</a:t>
+              <a:t>7/14/16</a:t>
             </a:fld>
             <a:endParaRPr lang="en-US"/>
           </a:p>
@@ -5523,7 +5522,7 @@
           <a:p>
             <a:fld id="{3869518C-F8F8-2041-85CC-55BAE734FAC4}" type="datetime1">
               <a:rPr lang="en-US" smtClean="0"/>
-              <a:t>7/5/16</a:t>
+              <a:t>7/14/16</a:t>
             </a:fld>
             <a:endParaRPr lang="en-US"/>
           </a:p>
@@ -5715,7 +5714,7 @@
           <a:p>
             <a:fld id="{D79CF100-C690-2548-A59E-01C6F77806AD}" type="datetime1">
               <a:rPr lang="en-US" smtClean="0"/>
-              <a:t>7/5/16</a:t>
+              <a:t>7/14/16</a:t>
             </a:fld>
             <a:endParaRPr lang="en-US"/>
           </a:p>
@@ -5919,7 +5918,7 @@
           <a:p>
             <a:fld id="{EA1ECE0B-6ABC-9D4A-9944-BE4084483D31}" type="datetime1">
               <a:rPr lang="en-US" smtClean="0"/>
-              <a:t>7/5/16</a:t>
+              <a:t>7/14/16</a:t>
             </a:fld>
             <a:endParaRPr lang="en-US"/>
           </a:p>
@@ -6093,7 +6092,7 @@
           <a:p>
             <a:fld id="{50808BD0-9C32-4C4B-B66B-306A9F13CF20}" type="datetime1">
               <a:rPr lang="en-US" smtClean="0"/>
-              <a:t>7/5/16</a:t>
+              <a:t>7/14/16</a:t>
             </a:fld>
             <a:endParaRPr lang="en-US"/>
           </a:p>
@@ -6343,7 +6342,7 @@
           <a:p>
             <a:fld id="{B81C913E-2851-A740-B3FD-F42F7400D340}" type="datetime1">
               <a:rPr lang="en-US" smtClean="0"/>
-              <a:t>7/5/16</a:t>
+              <a:t>7/14/16</a:t>
             </a:fld>
             <a:endParaRPr lang="en-US"/>
           </a:p>
@@ -6579,7 +6578,7 @@
           <a:p>
             <a:fld id="{53138FCE-A927-3844-9E3B-6083AB9AF783}" type="datetime1">
               <a:rPr lang="en-US" smtClean="0"/>
-              <a:t>7/5/16</a:t>
+              <a:t>7/14/16</a:t>
             </a:fld>
             <a:endParaRPr lang="en-US"/>
           </a:p>
@@ -6950,7 +6949,7 @@
           <a:p>
             <a:fld id="{589B6342-05E0-2B4D-B337-0AEB5C7EAB24}" type="datetime1">
               <a:rPr lang="en-US" smtClean="0"/>
-              <a:t>7/5/16</a:t>
+              <a:t>7/14/16</a:t>
             </a:fld>
             <a:endParaRPr lang="en-US"/>
           </a:p>
@@ -7072,7 +7071,7 @@
           <a:p>
             <a:fld id="{3737DE53-9418-984B-93FC-8DAE115B31D6}" type="datetime1">
               <a:rPr lang="en-US" smtClean="0"/>
-              <a:t>7/5/16</a:t>
+              <a:t>7/14/16</a:t>
             </a:fld>
             <a:endParaRPr lang="en-US"/>
           </a:p>
@@ -7171,7 +7170,7 @@
           <a:p>
             <a:fld id="{94564570-A037-2046-98C9-DB89177DA9ED}" type="datetime1">
               <a:rPr lang="en-US" smtClean="0"/>
-              <a:t>7/5/16</a:t>
+              <a:t>7/14/16</a:t>
             </a:fld>
             <a:endParaRPr lang="en-US"/>
           </a:p>
@@ -7429,7 +7428,7 @@
           <a:p>
             <a:fld id="{334090C8-B0EE-A244-98D0-35D20CF27A35}" type="datetime1">
               <a:rPr lang="en-US" smtClean="0"/>
-              <a:t>7/5/16</a:t>
+              <a:t>7/14/16</a:t>
             </a:fld>
             <a:endParaRPr lang="en-US"/>
           </a:p>
@@ -7710,7 +7709,7 @@
           <a:p>
             <a:fld id="{F63AA431-089C-8B4C-A74D-9FDFCF7A4A50}" type="datetime1">
               <a:rPr lang="en-US" smtClean="0"/>
-              <a:t>7/5/16</a:t>
+              <a:t>7/14/16</a:t>
             </a:fld>
             <a:endParaRPr lang="en-US"/>
           </a:p>
@@ -7971,7 +7970,7 @@
           <a:p>
             <a:fld id="{ADA3F11B-1739-D449-BD5E-3D05E6951917}" type="datetime1">
               <a:rPr lang="en-US" smtClean="0"/>
-              <a:t>7/5/16</a:t>
+              <a:t>7/14/16</a:t>
             </a:fld>
             <a:endParaRPr lang="en-US"/>
           </a:p>
@@ -8145,7 +8144,7 @@
           <a:p>
             <a:fld id="{F50FABB1-8177-344A-9D50-C38771FF47C7}" type="datetime1">
               <a:rPr lang="en-US" smtClean="0"/>
-              <a:t>7/5/16</a:t>
+              <a:t>7/14/16</a:t>
             </a:fld>
             <a:endParaRPr lang="en-US"/>
           </a:p>
@@ -8329,7 +8328,7 @@
           <a:p>
             <a:fld id="{64568BC6-E711-6D40-AB8F-60352FB91331}" type="datetime1">
               <a:rPr lang="en-US" smtClean="0"/>
-              <a:t>7/5/16</a:t>
+              <a:t>7/14/16</a:t>
             </a:fld>
             <a:endParaRPr lang="en-US"/>
           </a:p>
@@ -8626,7 +8625,7 @@
           <a:p>
             <a:fld id="{4A217A00-D458-E548-BA55-8E7DD7AEB72C}" type="datetime1">
               <a:rPr lang="en-US" smtClean="0"/>
-              <a:t>7/5/16</a:t>
+              <a:t>7/14/16</a:t>
             </a:fld>
             <a:endParaRPr lang="en-US"/>
           </a:p>
@@ -9074,7 +9073,7 @@
           <a:p>
             <a:fld id="{3B8D6C54-E6E7-A646-88ED-0E29FF59BEF7}" type="datetime1">
               <a:rPr lang="en-US" smtClean="0"/>
-              <a:t>7/5/16</a:t>
+              <a:t>7/14/16</a:t>
             </a:fld>
             <a:endParaRPr lang="en-US"/>
           </a:p>
@@ -9196,7 +9195,7 @@
           <a:p>
             <a:fld id="{5511632D-9F04-504B-9AAB-DF12FBEEFF0F}" type="datetime1">
               <a:rPr lang="en-US" smtClean="0"/>
-              <a:t>7/5/16</a:t>
+              <a:t>7/14/16</a:t>
             </a:fld>
             <a:endParaRPr lang="en-US"/>
           </a:p>
@@ -9295,7 +9294,7 @@
           <a:p>
             <a:fld id="{8A737330-94DB-DB4A-AE39-2D4C6E03B34B}" type="datetime1">
               <a:rPr lang="en-US" smtClean="0"/>
-              <a:t>7/5/16</a:t>
+              <a:t>7/14/16</a:t>
             </a:fld>
             <a:endParaRPr lang="en-US"/>
           </a:p>
@@ -9546,7 +9545,7 @@
           <a:p>
             <a:fld id="{BC1032C1-C631-FC47-BD14-B0D0AE380CAE}" type="datetime1">
               <a:rPr lang="en-US" smtClean="0"/>
-              <a:t>7/5/16</a:t>
+              <a:t>7/14/16</a:t>
             </a:fld>
             <a:endParaRPr lang="en-US"/>
           </a:p>
@@ -9849,7 +9848,7 @@
           <a:p>
             <a:fld id="{F5032A17-01AF-B84B-A814-B012C11277F9}" type="datetime1">
               <a:rPr lang="en-US" smtClean="0"/>
-              <a:t>7/5/16</a:t>
+              <a:t>7/14/16</a:t>
             </a:fld>
             <a:endParaRPr lang="en-US"/>
           </a:p>
@@ -10152,7 +10151,7 @@
           <a:p>
             <a:fld id="{63D44B9E-AC04-6549-B7EE-7B0A41CF751B}" type="datetime1">
               <a:rPr lang="en-US" smtClean="0"/>
-              <a:t>7/5/16</a:t>
+              <a:t>7/14/16</a:t>
             </a:fld>
             <a:endParaRPr lang="en-US"/>
           </a:p>
@@ -11105,7 +11104,7 @@
           <a:p>
             <a:fld id="{692EBBD4-7984-D84D-B013-2DE21F9AA31A}" type="datetime1">
               <a:rPr lang="en-US" smtClean="0"/>
-              <a:t>7/5/16</a:t>
+              <a:t>7/14/16</a:t>
             </a:fld>
             <a:endParaRPr lang="en-US"/>
           </a:p>
@@ -12195,7 +12194,7 @@
           <a:p>
             <a:fld id="{9551B5F9-1EB9-5146-A0A2-D543FBB3141E}" type="datetime1">
               <a:rPr lang="en-US" smtClean="0"/>
-              <a:t>7/5/16</a:t>
+              <a:t>7/14/16</a:t>
             </a:fld>
             <a:endParaRPr lang="en-US"/>
           </a:p>
@@ -12654,15 +12653,7 @@
             <a:pPr algn="ctr"/>
             <a:r>
               <a:rPr lang="en-US" dirty="0" smtClean="0"/>
-              <a:t>ROBOT </a:t>
-            </a:r>
-            <a:r>
-              <a:rPr lang="en-US" dirty="0" smtClean="0"/>
-              <a:t>DESIGN </a:t>
-            </a:r>
-            <a:r>
-              <a:rPr lang="en-US" dirty="0" smtClean="0"/>
-              <a:t>LESSON</a:t>
+              <a:t>ROBOT DESIGN LESSON</a:t>
             </a:r>
             <a:endParaRPr lang="en-US" dirty="0"/>
           </a:p>
@@ -12776,23 +12767,23 @@
             </a:pPr>
             <a:r>
               <a:rPr lang="en-US" dirty="0" smtClean="0"/>
-              <a:t>We do provide a robot design for the #45544 Set (</a:t>
-            </a:r>
-            <a:r>
-              <a:rPr lang="en-US" dirty="0" err="1" smtClean="0"/>
-              <a:t>DroidBot</a:t>
+              <a:t>We do provide a robot design for the #45544 Set </a:t>
             </a:r>
             <a:r>
               <a:rPr lang="en-US" dirty="0" smtClean="0"/>
-              <a:t>) and #31313 (</a:t>
-            </a:r>
-            <a:r>
-              <a:rPr lang="en-US" dirty="0" err="1" smtClean="0"/>
-              <a:t>DroidBot</a:t>
+              <a:t>(EV3 Discovery) </a:t>
             </a:r>
             <a:r>
               <a:rPr lang="en-US" dirty="0" smtClean="0"/>
-              <a:t> Jr). We usually test our lessons using this design.</a:t>
+              <a:t>and #31313 </a:t>
+            </a:r>
+            <a:r>
+              <a:rPr lang="en-US" dirty="0" smtClean="0"/>
+              <a:t>(Enterprise</a:t>
+            </a:r>
+            <a:r>
+              <a:rPr lang="en-US" dirty="0" smtClean="0"/>
+              <a:t>). </a:t>
             </a:r>
           </a:p>
           <a:p>
@@ -12802,7 +12793,11 @@
             </a:pPr>
             <a:r>
               <a:rPr lang="en-US" dirty="0" smtClean="0"/>
-              <a:t>You can also consider using the EV3 Educator model from the #45544 set, as well as the Riley Rover by Dr. Damien </a:t>
+              <a:t>You </a:t>
+            </a:r>
+            <a:r>
+              <a:rPr lang="en-US" dirty="0" smtClean="0"/>
+              <a:t>can also consider using the EV3 Educator model from the #45544 set, as well as the Riley Rover by Dr. Damien </a:t>
             </a:r>
             <a:r>
               <a:rPr lang="en-US" dirty="0" err="1" smtClean="0"/>
@@ -12923,191 +12918,224 @@
           <a:lstStyle/>
           <a:p>
             <a:r>
-              <a:rPr lang="en-US" dirty="0" err="1" smtClean="0"/>
-              <a:t>DroidBot</a:t>
-            </a:r>
-            <a:endParaRPr lang="en-US" dirty="0"/>
-          </a:p>
-        </p:txBody>
-      </p:sp>
-      <p:sp>
-        <p:nvSpPr>
-          <p:cNvPr id="3" name="Content Placeholder 2"/>
-          <p:cNvSpPr>
-            <a:spLocks noGrp="1"/>
-          </p:cNvSpPr>
-          <p:nvPr>
-            <p:ph idx="1"/>
-          </p:nvPr>
-        </p:nvSpPr>
-        <p:spPr>
-          <a:xfrm>
-            <a:off x="457200" y="1402916"/>
-            <a:ext cx="4189955" cy="4847572"/>
-          </a:xfrm>
-        </p:spPr>
-        <p:txBody>
-          <a:bodyPr>
-            <a:normAutofit fontScale="92500"/>
-          </a:bodyPr>
-          <a:lstStyle/>
-          <a:p>
-            <a:pPr marL="342900" indent="-342900">
-              <a:buFont typeface="Arial" charset="0"/>
-              <a:buChar char="•"/>
-            </a:pPr>
-            <a:r>
-              <a:rPr lang="en-US" dirty="0" smtClean="0"/>
-              <a:t>This robot was designed to be used with our lessons</a:t>
-            </a:r>
-          </a:p>
-          <a:p>
-            <a:pPr marL="342900" indent="-342900">
-              <a:buFont typeface="Arial" charset="0"/>
-              <a:buChar char="•"/>
-            </a:pPr>
-            <a:r>
-              <a:rPr lang="en-US" dirty="0" smtClean="0"/>
-              <a:t>It uses only pieces in one base EV3 Edu set (#45544) plus one additional color sensor (for the line squaring lesson)</a:t>
-            </a:r>
-          </a:p>
-          <a:p>
-            <a:pPr marL="342900" indent="-342900">
-              <a:buFont typeface="Arial" charset="0"/>
-              <a:buChar char="•"/>
-            </a:pPr>
-            <a:r>
-              <a:rPr lang="en-US" dirty="0"/>
-              <a:t>The </a:t>
-            </a:r>
-            <a:r>
-              <a:rPr lang="en-US" dirty="0" smtClean="0"/>
-              <a:t>optional handle </a:t>
-            </a:r>
-            <a:r>
-              <a:rPr lang="en-US" dirty="0"/>
-              <a:t>is useful for classroom/camp </a:t>
-            </a:r>
-            <a:r>
-              <a:rPr lang="en-US" dirty="0" smtClean="0"/>
-              <a:t>use</a:t>
-            </a:r>
-          </a:p>
-          <a:p>
-            <a:pPr marL="342900" indent="-342900">
-              <a:buFont typeface="Arial" charset="0"/>
-              <a:buChar char="•"/>
-            </a:pPr>
-            <a:r>
-              <a:rPr lang="en-US" dirty="0" smtClean="0"/>
-              <a:t>You can add a temperature sensor, an infrared sensor, and a sound sensor to complete particular lessons</a:t>
-            </a:r>
-          </a:p>
-          <a:p>
-            <a:pPr marL="342900" indent="-342900">
-              <a:buFont typeface="Arial" charset="0"/>
-              <a:buChar char="•"/>
-            </a:pPr>
-            <a:r>
-              <a:rPr lang="en-US" dirty="0" smtClean="0"/>
-              <a:t>Build instructions are available on the Robot Design Page</a:t>
-            </a:r>
-            <a:endParaRPr lang="en-US" dirty="0"/>
-          </a:p>
-        </p:txBody>
-      </p:sp>
-      <p:sp>
-        <p:nvSpPr>
-          <p:cNvPr id="4" name="Footer Placeholder 3"/>
-          <p:cNvSpPr>
-            <a:spLocks noGrp="1"/>
-          </p:cNvSpPr>
-          <p:nvPr>
-            <p:ph type="ftr" sz="quarter" idx="11"/>
-          </p:nvPr>
-        </p:nvSpPr>
-        <p:spPr/>
-        <p:txBody>
-          <a:bodyPr/>
-          <a:lstStyle/>
-          <a:p>
-            <a:r>
-              <a:rPr lang="sk-SK" smtClean="0"/>
-              <a:t>© 2016 EV3Lessons.com, Last Edit 7/04/2016</a:t>
-            </a:r>
-            <a:endParaRPr lang="en-US"/>
-          </a:p>
-        </p:txBody>
-      </p:sp>
-      <p:sp>
-        <p:nvSpPr>
-          <p:cNvPr id="5" name="Slide Number Placeholder 4"/>
-          <p:cNvSpPr>
-            <a:spLocks noGrp="1"/>
-          </p:cNvSpPr>
-          <p:nvPr>
-            <p:ph type="sldNum" sz="quarter" idx="12"/>
-          </p:nvPr>
-        </p:nvSpPr>
-        <p:spPr/>
-        <p:txBody>
-          <a:bodyPr/>
-          <a:lstStyle/>
-          <a:p>
-            <a:fld id="{4DBC7FC8-25FB-FC45-8177-2B991DA6778C}" type="slidenum">
-              <a:rPr lang="en-US" smtClean="0"/>
-              <a:t>3</a:t>
-            </a:fld>
-            <a:endParaRPr lang="en-US" dirty="0"/>
+              <a:rPr lang="en-US" smtClean="0"/>
+              <a:t>DISCOVERY &amp; ENTERPRISE</a:t>
+            </a:r>
+            <a:endParaRPr lang="en-US"/>
           </a:p>
         </p:txBody>
       </p:sp>
       <p:pic>
         <p:nvPicPr>
-          <p:cNvPr id="9" name="Picture 8"/>
+          <p:cNvPr id="6" name="Content Placeholder 5"/>
           <p:cNvPicPr>
-            <a:picLocks noChangeAspect="1"/>
+            <a:picLocks noGrp="1" noChangeAspect="1"/>
           </p:cNvPicPr>
-          <p:nvPr/>
+          <p:nvPr>
+            <p:ph idx="1"/>
+          </p:nvPr>
         </p:nvPicPr>
-        <p:blipFill rotWithShape="1">
-          <a:blip r:embed="rId2" cstate="print">
+        <p:blipFill>
+          <a:blip r:embed="rId2">
             <a:extLst>
               <a:ext uri="{28A0092B-C50C-407E-A947-70E740481C1C}">
                 <a14:useLocalDpi xmlns:a14="http://schemas.microsoft.com/office/drawing/2010/main"/>
               </a:ext>
             </a:extLst>
           </a:blip>
-          <a:srcRect/>
-          <a:stretch/>
+          <a:stretch>
+            <a:fillRect/>
+          </a:stretch>
         </p:blipFill>
         <p:spPr>
           <a:xfrm>
-            <a:off x="4606540" y="1524318"/>
-            <a:ext cx="4096134" cy="3586301"/>
+            <a:off x="6638795" y="3735156"/>
+            <a:ext cx="1956852" cy="2512724"/>
           </a:xfrm>
           <a:prstGeom prst="rect">
             <a:avLst/>
           </a:prstGeom>
+          <a:ln w="38100" cap="sq">
+            <a:solidFill>
+              <a:srgbClr val="000000"/>
+            </a:solidFill>
+            <a:prstDash val="solid"/>
+            <a:miter lim="800000"/>
+          </a:ln>
+          <a:effectLst>
+            <a:outerShdw blurRad="50800" dist="38100" dir="2700000" algn="tl" rotWithShape="0">
+              <a:srgbClr val="000000">
+                <a:alpha val="43000"/>
+              </a:srgbClr>
+            </a:outerShdw>
+          </a:effectLst>
+        </p:spPr>
+      </p:pic>
+      <p:sp>
+        <p:nvSpPr>
+          <p:cNvPr id="4" name="Footer Placeholder 3"/>
+          <p:cNvSpPr>
+            <a:spLocks noGrp="1"/>
+          </p:cNvSpPr>
+          <p:nvPr>
+            <p:ph type="ftr" sz="quarter" idx="11"/>
+          </p:nvPr>
+        </p:nvSpPr>
+        <p:spPr/>
+        <p:txBody>
+          <a:bodyPr/>
+          <a:lstStyle/>
+          <a:p>
+            <a:r>
+              <a:rPr lang="sk-SK" smtClean="0"/>
+              <a:t>© 2016 EV3Lessons.com, Last Edit 7/04/2016</a:t>
+            </a:r>
+            <a:endParaRPr lang="en-US"/>
+          </a:p>
+        </p:txBody>
+      </p:sp>
+      <p:sp>
+        <p:nvSpPr>
+          <p:cNvPr id="5" name="Slide Number Placeholder 4"/>
+          <p:cNvSpPr>
+            <a:spLocks noGrp="1"/>
+          </p:cNvSpPr>
+          <p:nvPr>
+            <p:ph type="sldNum" sz="quarter" idx="12"/>
+          </p:nvPr>
+        </p:nvSpPr>
+        <p:spPr/>
+        <p:txBody>
+          <a:bodyPr/>
+          <a:lstStyle/>
+          <a:p>
+            <a:fld id="{4DBC7FC8-25FB-FC45-8177-2B991DA6778C}" type="slidenum">
+              <a:rPr lang="en-US" smtClean="0"/>
+              <a:t>3</a:t>
+            </a:fld>
+            <a:endParaRPr lang="en-US" dirty="0"/>
+          </a:p>
+        </p:txBody>
+      </p:sp>
+      <p:sp>
+        <p:nvSpPr>
+          <p:cNvPr id="7" name="TextBox 6"/>
+          <p:cNvSpPr txBox="1"/>
+          <p:nvPr/>
+        </p:nvSpPr>
+        <p:spPr>
+          <a:xfrm>
+            <a:off x="563671" y="1245617"/>
+            <a:ext cx="4446740" cy="5078313"/>
+          </a:xfrm>
+          <a:prstGeom prst="rect">
+            <a:avLst/>
+          </a:prstGeom>
+          <a:noFill/>
+        </p:spPr>
+        <p:txBody>
+          <a:bodyPr wrap="square" rtlCol="0">
+            <a:spAutoFit/>
+          </a:bodyPr>
+          <a:lstStyle/>
+          <a:p>
+            <a:r>
+              <a:rPr lang="en-US" b="1" dirty="0" smtClean="0"/>
+              <a:t>These robots are designed to use only parts available in the #45544 and #31313 EV3 sets</a:t>
+            </a:r>
+          </a:p>
+          <a:p>
+            <a:endParaRPr lang="en-US" b="1" dirty="0"/>
+          </a:p>
+          <a:p>
+            <a:r>
+              <a:rPr lang="en-US" b="1" dirty="0" smtClean="0"/>
+              <a:t>The base robots use less than 100 LEGO elements</a:t>
+            </a:r>
+          </a:p>
+          <a:p>
+            <a:endParaRPr lang="en-US" b="1" dirty="0"/>
+          </a:p>
+          <a:p>
+            <a:r>
+              <a:rPr lang="en-US" b="1" dirty="0" smtClean="0"/>
+              <a:t>The sensors and medium motor are modular and can be added when needed</a:t>
+            </a:r>
+          </a:p>
+          <a:p>
+            <a:endParaRPr lang="en-US" b="1" dirty="0"/>
+          </a:p>
+          <a:p>
+            <a:r>
+              <a:rPr lang="en-US" b="1" dirty="0" smtClean="0"/>
+              <a:t>We do provide instructions for where to mount the additional sensors (e.g. gyro) in Enterprise</a:t>
+            </a:r>
+          </a:p>
+          <a:p>
+            <a:endParaRPr lang="en-US" b="1" dirty="0"/>
+          </a:p>
+          <a:p>
+            <a:r>
+              <a:rPr lang="en-US" b="1" dirty="0" smtClean="0"/>
+              <a:t>We also provide a location for a second color sensor (needed for the Squaring on Line lesson in Advance)</a:t>
+            </a:r>
+          </a:p>
+        </p:txBody>
+      </p:sp>
+      <p:pic>
+        <p:nvPicPr>
+          <p:cNvPr id="8" name="Picture 7"/>
+          <p:cNvPicPr>
+            <a:picLocks noChangeAspect="1"/>
+          </p:cNvPicPr>
+          <p:nvPr/>
+        </p:nvPicPr>
+        <p:blipFill>
+          <a:blip r:embed="rId3">
+            <a:extLst>
+              <a:ext uri="{28A0092B-C50C-407E-A947-70E740481C1C}">
+                <a14:useLocalDpi xmlns:a14="http://schemas.microsoft.com/office/drawing/2010/main"/>
+              </a:ext>
+            </a:extLst>
+          </a:blip>
+          <a:stretch>
+            <a:fillRect/>
+          </a:stretch>
+        </p:blipFill>
+        <p:spPr>
+          <a:xfrm>
+            <a:off x="5010411" y="1115291"/>
+            <a:ext cx="1961631" cy="2530983"/>
+          </a:xfrm>
+          <a:prstGeom prst="rect">
+            <a:avLst/>
+          </a:prstGeom>
+          <a:ln w="38100" cap="sq">
+            <a:solidFill>
+              <a:srgbClr val="000000"/>
+            </a:solidFill>
+            <a:prstDash val="solid"/>
+            <a:miter lim="800000"/>
+          </a:ln>
+          <a:effectLst>
+            <a:outerShdw blurRad="50800" dist="38100" dir="2700000" algn="tl" rotWithShape="0">
+              <a:srgbClr val="000000">
+                <a:alpha val="43000"/>
+              </a:srgbClr>
+            </a:outerShdw>
+          </a:effectLst>
         </p:spPr>
       </p:pic>
     </p:spTree>
     <p:extLst>
       <p:ext uri="{BB962C8B-B14F-4D97-AF65-F5344CB8AC3E}">
-        <p14:creationId xmlns:p14="http://schemas.microsoft.com/office/powerpoint/2010/main" val="803085872"/>
+        <p14:creationId xmlns:p14="http://schemas.microsoft.com/office/powerpoint/2010/main" val="722960571"/>
       </p:ext>
     </p:extLst>
   </p:cSld>
   <p:clrMapOvr>
     <a:masterClrMapping/>
   </p:clrMapOvr>
-  <p:timing>
-    <p:tnLst>
-      <p:par>
-        <p:cTn id="1" dur="indefinite" restart="never" nodeType="tmRoot"/>
-      </p:par>
-    </p:tnLst>
-  </p:timing>
 </p:sld>
 </file>
 
@@ -13145,210 +13173,6 @@
           <a:p>
             <a:r>
               <a:rPr lang="en-US" dirty="0" smtClean="0"/>
-              <a:t>DROIDBOT Jr</a:t>
-            </a:r>
-            <a:endParaRPr lang="en-US" dirty="0"/>
-          </a:p>
-        </p:txBody>
-      </p:sp>
-      <p:sp>
-        <p:nvSpPr>
-          <p:cNvPr id="4" name="Footer Placeholder 3"/>
-          <p:cNvSpPr>
-            <a:spLocks noGrp="1"/>
-          </p:cNvSpPr>
-          <p:nvPr>
-            <p:ph type="ftr" sz="quarter" idx="11"/>
-          </p:nvPr>
-        </p:nvSpPr>
-        <p:spPr/>
-        <p:txBody>
-          <a:bodyPr/>
-          <a:lstStyle/>
-          <a:p>
-            <a:r>
-              <a:rPr lang="sk-SK" smtClean="0"/>
-              <a:t>© 2016 EV3Lessons.com, Last Edit 7/04/2016</a:t>
-            </a:r>
-            <a:endParaRPr lang="en-US"/>
-          </a:p>
-        </p:txBody>
-      </p:sp>
-      <p:sp>
-        <p:nvSpPr>
-          <p:cNvPr id="5" name="Slide Number Placeholder 4"/>
-          <p:cNvSpPr>
-            <a:spLocks noGrp="1"/>
-          </p:cNvSpPr>
-          <p:nvPr>
-            <p:ph type="sldNum" sz="quarter" idx="12"/>
-          </p:nvPr>
-        </p:nvSpPr>
-        <p:spPr/>
-        <p:txBody>
-          <a:bodyPr/>
-          <a:lstStyle/>
-          <a:p>
-            <a:fld id="{4DBC7FC8-25FB-FC45-8177-2B991DA6778C}" type="slidenum">
-              <a:rPr lang="en-US" smtClean="0"/>
-              <a:t>4</a:t>
-            </a:fld>
-            <a:endParaRPr lang="en-US" dirty="0"/>
-          </a:p>
-        </p:txBody>
-      </p:sp>
-      <p:sp>
-        <p:nvSpPr>
-          <p:cNvPr id="6" name="Content Placeholder 2"/>
-          <p:cNvSpPr>
-            <a:spLocks noGrp="1"/>
-          </p:cNvSpPr>
-          <p:nvPr>
-            <p:ph idx="1"/>
-          </p:nvPr>
-        </p:nvSpPr>
-        <p:spPr>
-          <a:xfrm>
-            <a:off x="457200" y="1524318"/>
-            <a:ext cx="4703523" cy="4601845"/>
-          </a:xfrm>
-        </p:spPr>
-        <p:txBody>
-          <a:bodyPr>
-            <a:normAutofit lnSpcReduction="10000"/>
-          </a:bodyPr>
-          <a:lstStyle/>
-          <a:p>
-            <a:pPr marL="342900" indent="-342900">
-              <a:buFont typeface="Arial" charset="0"/>
-              <a:buChar char="•"/>
-            </a:pPr>
-            <a:r>
-              <a:rPr lang="en-US" dirty="0" smtClean="0"/>
-              <a:t>This robot was designed to be used with our lessons</a:t>
-            </a:r>
-          </a:p>
-          <a:p>
-            <a:pPr marL="342900" indent="-342900">
-              <a:buFont typeface="Arial" charset="0"/>
-              <a:buChar char="•"/>
-            </a:pPr>
-            <a:r>
-              <a:rPr lang="en-US" dirty="0" smtClean="0"/>
-              <a:t>The handle is useful for classroom/camp use</a:t>
-            </a:r>
-          </a:p>
-          <a:p>
-            <a:pPr marL="342900" indent="-342900">
-              <a:buFont typeface="Arial" charset="0"/>
-              <a:buChar char="•"/>
-            </a:pPr>
-            <a:r>
-              <a:rPr lang="en-US" dirty="0" smtClean="0"/>
-              <a:t>It uses only pieces in the base EV3 Retail set (#31313) </a:t>
-            </a:r>
-          </a:p>
-          <a:p>
-            <a:pPr marL="342900" indent="-342900">
-              <a:buFont typeface="Arial" charset="0"/>
-              <a:buChar char="•"/>
-            </a:pPr>
-            <a:r>
-              <a:rPr lang="en-US" dirty="0" smtClean="0"/>
-              <a:t>You can add a second color sensor, a gyro sensor, an ultrasonic sensor, a temperature sensor, and a sound sensor to complete particular lessons</a:t>
-            </a:r>
-          </a:p>
-          <a:p>
-            <a:pPr marL="342900" indent="-342900">
-              <a:buFont typeface="Arial" charset="0"/>
-              <a:buChar char="•"/>
-            </a:pPr>
-            <a:r>
-              <a:rPr lang="en-US" dirty="0" smtClean="0"/>
-              <a:t>Build instructions are available on the Robot Designs page.</a:t>
-            </a:r>
-            <a:endParaRPr lang="en-US" dirty="0"/>
-          </a:p>
-        </p:txBody>
-      </p:sp>
-      <p:pic>
-        <p:nvPicPr>
-          <p:cNvPr id="9" name="Picture 8"/>
-          <p:cNvPicPr>
-            <a:picLocks noChangeAspect="1"/>
-          </p:cNvPicPr>
-          <p:nvPr/>
-        </p:nvPicPr>
-        <p:blipFill>
-          <a:blip r:embed="rId2"/>
-          <a:stretch>
-            <a:fillRect/>
-          </a:stretch>
-        </p:blipFill>
-        <p:spPr>
-          <a:xfrm>
-            <a:off x="5269683" y="1988861"/>
-            <a:ext cx="3187700" cy="3187700"/>
-          </a:xfrm>
-          <a:prstGeom prst="rect">
-            <a:avLst/>
-          </a:prstGeom>
-        </p:spPr>
-      </p:pic>
-    </p:spTree>
-    <p:extLst>
-      <p:ext uri="{BB962C8B-B14F-4D97-AF65-F5344CB8AC3E}">
-        <p14:creationId xmlns:p14="http://schemas.microsoft.com/office/powerpoint/2010/main" val="1815090927"/>
-      </p:ext>
-    </p:extLst>
-  </p:cSld>
-  <p:clrMapOvr>
-    <a:masterClrMapping/>
-  </p:clrMapOvr>
-  <p:timing>
-    <p:tnLst>
-      <p:par>
-        <p:cTn id="1" dur="indefinite" restart="never" nodeType="tmRoot"/>
-      </p:par>
-    </p:tnLst>
-  </p:timing>
-</p:sld>
-</file>
-
-<file path=ppt/slides/slide5.xml><?xml version="1.0" encoding="utf-8"?>
-<p:sld xmlns:a="http://schemas.openxmlformats.org/drawingml/2006/main" xmlns:r="http://schemas.openxmlformats.org/officeDocument/2006/relationships" xmlns:p="http://schemas.openxmlformats.org/presentationml/2006/main">
-  <p:cSld>
-    <p:spTree>
-      <p:nvGrpSpPr>
-        <p:cNvPr id="1" name=""/>
-        <p:cNvGrpSpPr/>
-        <p:nvPr/>
-      </p:nvGrpSpPr>
-      <p:grpSpPr>
-        <a:xfrm>
-          <a:off x="0" y="0"/>
-          <a:ext cx="0" cy="0"/>
-          <a:chOff x="0" y="0"/>
-          <a:chExt cx="0" cy="0"/>
-        </a:xfrm>
-      </p:grpSpPr>
-      <p:sp>
-        <p:nvSpPr>
-          <p:cNvPr id="2" name="Title 1"/>
-          <p:cNvSpPr>
-            <a:spLocks noGrp="1"/>
-          </p:cNvSpPr>
-          <p:nvPr>
-            <p:ph type="title"/>
-          </p:nvPr>
-        </p:nvSpPr>
-        <p:spPr/>
-        <p:txBody>
-          <a:bodyPr/>
-          <a:lstStyle/>
-          <a:p>
-            <a:r>
-              <a:rPr lang="en-US" dirty="0" smtClean="0"/>
               <a:t>EV3 ROBOT EDUCATOR</a:t>
             </a:r>
             <a:endParaRPr lang="en-US" dirty="0"/>
@@ -13468,7 +13292,7 @@
           <a:p>
             <a:fld id="{4DBC7FC8-25FB-FC45-8177-2B991DA6778C}" type="slidenum">
               <a:rPr lang="en-US" smtClean="0"/>
-              <a:t>5</a:t>
+              <a:t>4</a:t>
             </a:fld>
             <a:endParaRPr lang="en-US" dirty="0"/>
           </a:p>
@@ -13562,7 +13386,7 @@
 </p:sld>
 </file>
 
-<file path=ppt/slides/slide6.xml><?xml version="1.0" encoding="utf-8"?>
+<file path=ppt/slides/slide5.xml><?xml version="1.0" encoding="utf-8"?>
 <p:sld xmlns:a="http://schemas.openxmlformats.org/drawingml/2006/main" xmlns:r="http://schemas.openxmlformats.org/officeDocument/2006/relationships" xmlns:p="http://schemas.openxmlformats.org/presentationml/2006/main">
   <p:cSld>
     <p:spTree>
@@ -13709,7 +13533,7 @@
           <a:p>
             <a:fld id="{4DBC7FC8-25FB-FC45-8177-2B991DA6778C}" type="slidenum">
               <a:rPr lang="en-US" smtClean="0"/>
-              <a:t>6</a:t>
+              <a:t>5</a:t>
             </a:fld>
             <a:endParaRPr lang="en-US" dirty="0"/>
           </a:p>
@@ -13759,7 +13583,7 @@
 </p:sld>
 </file>
 
-<file path=ppt/slides/slide7.xml><?xml version="1.0" encoding="utf-8"?>
+<file path=ppt/slides/slide6.xml><?xml version="1.0" encoding="utf-8"?>
 <p:sld xmlns:a="http://schemas.openxmlformats.org/drawingml/2006/main" xmlns:r="http://schemas.openxmlformats.org/officeDocument/2006/relationships" xmlns:p="http://schemas.openxmlformats.org/presentationml/2006/main">
   <p:cSld>
     <p:spTree>
@@ -13890,7 +13714,7 @@
             <a:fld id="{4382A7F7-08BF-4252-8141-63FB96055BBB}" type="slidenum">
               <a:rPr lang="en-US" smtClean="0"/>
               <a:pPr/>
-              <a:t>7</a:t>
+              <a:t>6</a:t>
             </a:fld>
             <a:endParaRPr lang="en-US"/>
           </a:p>
@@ -13921,7 +13745,7 @@
           <a:effectLst/>
           <a:extLst>
             <a:ext uri="{91240B29-F687-4f45-9708-019B960494DF}">
-              <a14:hiddenLine xmlns:a14="http://schemas.microsoft.com/office/drawing/2010/main" xmlns="" w="9525">
+              <a14:hiddenLine xmlns="" xmlns:a14="http://schemas.microsoft.com/office/drawing/2010/main" w="9525">
                 <a:solidFill>
                   <a:schemeClr val="tx1"/>
                 </a:solidFill>
@@ -13931,7 +13755,7 @@
               </a14:hiddenLine>
             </a:ext>
             <a:ext uri="{AF507438-7753-43e0-B8FC-AC1667EBCBE1}">
-              <a14:hiddenEffects xmlns:a14="http://schemas.microsoft.com/office/drawing/2010/main" xmlns="">
+              <a14:hiddenEffects xmlns="" xmlns:a14="http://schemas.microsoft.com/office/drawing/2010/main">
                 <a:effectLst>
                   <a:outerShdw dist="35921" dir="2700000" algn="ctr" rotWithShape="0">
                     <a:schemeClr val="bg2"/>
@@ -14284,7 +14108,7 @@
           <a:noFill/>
           <a:extLst>
             <a:ext uri="{909E8E84-426E-40dd-AFC4-6F175D3DCCD1}">
-              <a14:hiddenFill xmlns:a14="http://schemas.microsoft.com/office/drawing/2010/main" xmlns="">
+              <a14:hiddenFill xmlns="" xmlns:a14="http://schemas.microsoft.com/office/drawing/2010/main">
                 <a:solidFill>
                   <a:srgbClr val="FFFFFF"/>
                 </a:solidFill>

</xml_diff>

<commit_message>
New Gyro position lesson, logo added to rest
</commit_message>
<xml_diff>
--- a/translations/en-us/robots/BaseRobot.pptx
+++ b/translations/en-us/robots/BaseRobot.pptx
@@ -218,7 +218,7 @@
           <a:p>
             <a:fld id="{E354B44E-40A3-0E46-B16A-9BF1250A248B}" type="datetimeFigureOut">
               <a:rPr lang="en-US" smtClean="0"/>
-              <a:t>7/14/16</a:t>
+              <a:t>8/4/16</a:t>
             </a:fld>
             <a:endParaRPr lang="en-US"/>
           </a:p>
@@ -384,7 +384,7 @@
           <a:p>
             <a:fld id="{C86AD16C-2DB4-6642-BAD4-9ED973A087A0}" type="datetimeFigureOut">
               <a:rPr lang="en-US" smtClean="0"/>
-              <a:t>7/14/16</a:t>
+              <a:t>8/4/16</a:t>
             </a:fld>
             <a:endParaRPr lang="en-US"/>
           </a:p>
@@ -930,7 +930,7 @@
           <a:p>
             <a:fld id="{4079049D-260D-7341-ACBB-7F6E88B670AF}" type="datetime1">
               <a:rPr lang="en-US" smtClean="0"/>
-              <a:t>7/14/16</a:t>
+              <a:t>8/4/16</a:t>
             </a:fld>
             <a:endParaRPr lang="en-US"/>
           </a:p>
@@ -1529,7 +1529,7 @@
           <a:p>
             <a:fld id="{D23FB13C-50E9-E247-B6CA-7FFE79A5F656}" type="datetime1">
               <a:rPr lang="en-US" smtClean="0"/>
-              <a:t>7/14/16</a:t>
+              <a:t>8/4/16</a:t>
             </a:fld>
             <a:endParaRPr lang="en-US"/>
           </a:p>
@@ -1713,7 +1713,7 @@
           <a:p>
             <a:fld id="{2240301C-C036-B244-8BEA-8C69B4259916}" type="datetime1">
               <a:rPr lang="en-US" smtClean="0"/>
-              <a:t>7/14/16</a:t>
+              <a:t>8/4/16</a:t>
             </a:fld>
             <a:endParaRPr lang="en-US"/>
           </a:p>
@@ -1930,7 +1930,7 @@
           <a:p>
             <a:fld id="{6D3B6815-494D-AC43-9B33-2F9570967BF1}" type="datetime1">
               <a:rPr lang="en-US" smtClean="0"/>
-              <a:t>7/14/16</a:t>
+              <a:t>8/4/16</a:t>
             </a:fld>
             <a:endParaRPr lang="en-US"/>
           </a:p>
@@ -2149,7 +2149,7 @@
           <a:noFill/>
           <a:extLst>
             <a:ext uri="{909E8E84-426E-40dd-AFC4-6F175D3DCCD1}">
-              <a14:hiddenFill xmlns="" xmlns:a14="http://schemas.microsoft.com/office/drawing/2010/main">
+              <a14:hiddenFill xmlns:a14="http://schemas.microsoft.com/office/drawing/2010/main" xmlns="">
                 <a:solidFill>
                   <a:srgbClr val="FFFFFF"/>
                 </a:solidFill>
@@ -3201,7 +3201,7 @@
           <a:p>
             <a:fld id="{8F36B86E-CFB1-CA4E-9DF9-B0CEC6E07421}" type="datetime1">
               <a:rPr lang="en-US" smtClean="0"/>
-              <a:t>7/14/16</a:t>
+              <a:t>8/4/16</a:t>
             </a:fld>
             <a:endParaRPr lang="en-US"/>
           </a:p>
@@ -3474,7 +3474,7 @@
           <a:p>
             <a:fld id="{CEB03A98-E1B0-3440-912D-EBE5F791588D}" type="datetime1">
               <a:rPr lang="en-US" smtClean="0"/>
-              <a:t>7/14/16</a:t>
+              <a:t>8/4/16</a:t>
             </a:fld>
             <a:endParaRPr lang="en-US"/>
           </a:p>
@@ -3779,7 +3779,7 @@
           <a:p>
             <a:fld id="{2AFAA2E9-D72B-AD48-AF1F-52A08EBA4303}" type="datetime1">
               <a:rPr lang="en-US" smtClean="0"/>
-              <a:t>7/14/16</a:t>
+              <a:t>8/4/16</a:t>
             </a:fld>
             <a:endParaRPr lang="en-US"/>
           </a:p>
@@ -4242,7 +4242,7 @@
           <a:p>
             <a:fld id="{962D5479-4DE8-6441-8AD0-9A685ACF12B8}" type="datetime1">
               <a:rPr lang="en-US" smtClean="0"/>
-              <a:t>7/14/16</a:t>
+              <a:t>8/4/16</a:t>
             </a:fld>
             <a:endParaRPr lang="en-US"/>
           </a:p>
@@ -4379,7 +4379,7 @@
           <a:p>
             <a:fld id="{66D21241-F89D-A94C-9EDF-69E3F40ABE0B}" type="datetime1">
               <a:rPr lang="en-US" smtClean="0"/>
-              <a:t>7/14/16</a:t>
+              <a:t>8/4/16</a:t>
             </a:fld>
             <a:endParaRPr lang="en-US"/>
           </a:p>
@@ -4493,7 +4493,7 @@
           <a:p>
             <a:fld id="{D3DC5F3B-56FA-F546-A574-CF6D118384F4}" type="datetime1">
               <a:rPr lang="en-US" smtClean="0"/>
-              <a:t>7/14/16</a:t>
+              <a:t>8/4/16</a:t>
             </a:fld>
             <a:endParaRPr lang="en-US"/>
           </a:p>
@@ -4752,7 +4752,7 @@
           <a:p>
             <a:fld id="{3BC196E9-40E7-7B40-BAB3-173E3286BBA4}" type="datetime1">
               <a:rPr lang="en-US" smtClean="0"/>
-              <a:t>7/14/16</a:t>
+              <a:t>8/4/16</a:t>
             </a:fld>
             <a:endParaRPr lang="en-US"/>
           </a:p>
@@ -4967,7 +4967,7 @@
           <a:p>
             <a:fld id="{2B4934FA-BB7E-FA4B-8587-3422606245F1}" type="datetime1">
               <a:rPr lang="en-US" smtClean="0"/>
-              <a:t>7/14/16</a:t>
+              <a:t>8/4/16</a:t>
             </a:fld>
             <a:endParaRPr lang="en-US"/>
           </a:p>
@@ -5252,7 +5252,7 @@
           <a:p>
             <a:fld id="{36F29019-D865-2D41-8B16-2696D9E9FF36}" type="datetime1">
               <a:rPr lang="en-US" smtClean="0"/>
-              <a:t>7/14/16</a:t>
+              <a:t>8/4/16</a:t>
             </a:fld>
             <a:endParaRPr lang="en-US"/>
           </a:p>
@@ -5522,7 +5522,7 @@
           <a:p>
             <a:fld id="{3869518C-F8F8-2041-85CC-55BAE734FAC4}" type="datetime1">
               <a:rPr lang="en-US" smtClean="0"/>
-              <a:t>7/14/16</a:t>
+              <a:t>8/4/16</a:t>
             </a:fld>
             <a:endParaRPr lang="en-US"/>
           </a:p>
@@ -5714,7 +5714,7 @@
           <a:p>
             <a:fld id="{D79CF100-C690-2548-A59E-01C6F77806AD}" type="datetime1">
               <a:rPr lang="en-US" smtClean="0"/>
-              <a:t>7/14/16</a:t>
+              <a:t>8/4/16</a:t>
             </a:fld>
             <a:endParaRPr lang="en-US"/>
           </a:p>
@@ -5918,7 +5918,7 @@
           <a:p>
             <a:fld id="{EA1ECE0B-6ABC-9D4A-9944-BE4084483D31}" type="datetime1">
               <a:rPr lang="en-US" smtClean="0"/>
-              <a:t>7/14/16</a:t>
+              <a:t>8/4/16</a:t>
             </a:fld>
             <a:endParaRPr lang="en-US"/>
           </a:p>
@@ -6092,7 +6092,7 @@
           <a:p>
             <a:fld id="{50808BD0-9C32-4C4B-B66B-306A9F13CF20}" type="datetime1">
               <a:rPr lang="en-US" smtClean="0"/>
-              <a:t>7/14/16</a:t>
+              <a:t>8/4/16</a:t>
             </a:fld>
             <a:endParaRPr lang="en-US"/>
           </a:p>
@@ -6342,7 +6342,7 @@
           <a:p>
             <a:fld id="{B81C913E-2851-A740-B3FD-F42F7400D340}" type="datetime1">
               <a:rPr lang="en-US" smtClean="0"/>
-              <a:t>7/14/16</a:t>
+              <a:t>8/4/16</a:t>
             </a:fld>
             <a:endParaRPr lang="en-US"/>
           </a:p>
@@ -6578,7 +6578,7 @@
           <a:p>
             <a:fld id="{53138FCE-A927-3844-9E3B-6083AB9AF783}" type="datetime1">
               <a:rPr lang="en-US" smtClean="0"/>
-              <a:t>7/14/16</a:t>
+              <a:t>8/4/16</a:t>
             </a:fld>
             <a:endParaRPr lang="en-US"/>
           </a:p>
@@ -6949,7 +6949,7 @@
           <a:p>
             <a:fld id="{589B6342-05E0-2B4D-B337-0AEB5C7EAB24}" type="datetime1">
               <a:rPr lang="en-US" smtClean="0"/>
-              <a:t>7/14/16</a:t>
+              <a:t>8/4/16</a:t>
             </a:fld>
             <a:endParaRPr lang="en-US"/>
           </a:p>
@@ -7071,7 +7071,7 @@
           <a:p>
             <a:fld id="{3737DE53-9418-984B-93FC-8DAE115B31D6}" type="datetime1">
               <a:rPr lang="en-US" smtClean="0"/>
-              <a:t>7/14/16</a:t>
+              <a:t>8/4/16</a:t>
             </a:fld>
             <a:endParaRPr lang="en-US"/>
           </a:p>
@@ -7170,7 +7170,7 @@
           <a:p>
             <a:fld id="{94564570-A037-2046-98C9-DB89177DA9ED}" type="datetime1">
               <a:rPr lang="en-US" smtClean="0"/>
-              <a:t>7/14/16</a:t>
+              <a:t>8/4/16</a:t>
             </a:fld>
             <a:endParaRPr lang="en-US"/>
           </a:p>
@@ -7428,7 +7428,7 @@
           <a:p>
             <a:fld id="{334090C8-B0EE-A244-98D0-35D20CF27A35}" type="datetime1">
               <a:rPr lang="en-US" smtClean="0"/>
-              <a:t>7/14/16</a:t>
+              <a:t>8/4/16</a:t>
             </a:fld>
             <a:endParaRPr lang="en-US"/>
           </a:p>
@@ -7709,7 +7709,7 @@
           <a:p>
             <a:fld id="{F63AA431-089C-8B4C-A74D-9FDFCF7A4A50}" type="datetime1">
               <a:rPr lang="en-US" smtClean="0"/>
-              <a:t>7/14/16</a:t>
+              <a:t>8/4/16</a:t>
             </a:fld>
             <a:endParaRPr lang="en-US"/>
           </a:p>
@@ -7970,7 +7970,7 @@
           <a:p>
             <a:fld id="{ADA3F11B-1739-D449-BD5E-3D05E6951917}" type="datetime1">
               <a:rPr lang="en-US" smtClean="0"/>
-              <a:t>7/14/16</a:t>
+              <a:t>8/4/16</a:t>
             </a:fld>
             <a:endParaRPr lang="en-US"/>
           </a:p>
@@ -8144,7 +8144,7 @@
           <a:p>
             <a:fld id="{F50FABB1-8177-344A-9D50-C38771FF47C7}" type="datetime1">
               <a:rPr lang="en-US" smtClean="0"/>
-              <a:t>7/14/16</a:t>
+              <a:t>8/4/16</a:t>
             </a:fld>
             <a:endParaRPr lang="en-US"/>
           </a:p>
@@ -8328,7 +8328,7 @@
           <a:p>
             <a:fld id="{64568BC6-E711-6D40-AB8F-60352FB91331}" type="datetime1">
               <a:rPr lang="en-US" smtClean="0"/>
-              <a:t>7/14/16</a:t>
+              <a:t>8/4/16</a:t>
             </a:fld>
             <a:endParaRPr lang="en-US"/>
           </a:p>
@@ -8625,7 +8625,7 @@
           <a:p>
             <a:fld id="{4A217A00-D458-E548-BA55-8E7DD7AEB72C}" type="datetime1">
               <a:rPr lang="en-US" smtClean="0"/>
-              <a:t>7/14/16</a:t>
+              <a:t>8/4/16</a:t>
             </a:fld>
             <a:endParaRPr lang="en-US"/>
           </a:p>
@@ -9073,7 +9073,7 @@
           <a:p>
             <a:fld id="{3B8D6C54-E6E7-A646-88ED-0E29FF59BEF7}" type="datetime1">
               <a:rPr lang="en-US" smtClean="0"/>
-              <a:t>7/14/16</a:t>
+              <a:t>8/4/16</a:t>
             </a:fld>
             <a:endParaRPr lang="en-US"/>
           </a:p>
@@ -9195,7 +9195,7 @@
           <a:p>
             <a:fld id="{5511632D-9F04-504B-9AAB-DF12FBEEFF0F}" type="datetime1">
               <a:rPr lang="en-US" smtClean="0"/>
-              <a:t>7/14/16</a:t>
+              <a:t>8/4/16</a:t>
             </a:fld>
             <a:endParaRPr lang="en-US"/>
           </a:p>
@@ -9294,7 +9294,7 @@
           <a:p>
             <a:fld id="{8A737330-94DB-DB4A-AE39-2D4C6E03B34B}" type="datetime1">
               <a:rPr lang="en-US" smtClean="0"/>
-              <a:t>7/14/16</a:t>
+              <a:t>8/4/16</a:t>
             </a:fld>
             <a:endParaRPr lang="en-US"/>
           </a:p>
@@ -9545,7 +9545,7 @@
           <a:p>
             <a:fld id="{BC1032C1-C631-FC47-BD14-B0D0AE380CAE}" type="datetime1">
               <a:rPr lang="en-US" smtClean="0"/>
-              <a:t>7/14/16</a:t>
+              <a:t>8/4/16</a:t>
             </a:fld>
             <a:endParaRPr lang="en-US"/>
           </a:p>
@@ -9848,7 +9848,7 @@
           <a:p>
             <a:fld id="{F5032A17-01AF-B84B-A814-B012C11277F9}" type="datetime1">
               <a:rPr lang="en-US" smtClean="0"/>
-              <a:t>7/14/16</a:t>
+              <a:t>8/4/16</a:t>
             </a:fld>
             <a:endParaRPr lang="en-US"/>
           </a:p>
@@ -10151,7 +10151,7 @@
           <a:p>
             <a:fld id="{63D44B9E-AC04-6549-B7EE-7B0A41CF751B}" type="datetime1">
               <a:rPr lang="en-US" smtClean="0"/>
-              <a:t>7/14/16</a:t>
+              <a:t>8/4/16</a:t>
             </a:fld>
             <a:endParaRPr lang="en-US"/>
           </a:p>
@@ -11104,7 +11104,7 @@
           <a:p>
             <a:fld id="{692EBBD4-7984-D84D-B013-2DE21F9AA31A}" type="datetime1">
               <a:rPr lang="en-US" smtClean="0"/>
-              <a:t>7/14/16</a:t>
+              <a:t>8/4/16</a:t>
             </a:fld>
             <a:endParaRPr lang="en-US"/>
           </a:p>
@@ -12194,7 +12194,7 @@
           <a:p>
             <a:fld id="{9551B5F9-1EB9-5146-A0A2-D543FBB3141E}" type="datetime1">
               <a:rPr lang="en-US" smtClean="0"/>
-              <a:t>7/14/16</a:t>
+              <a:t>8/4/16</a:t>
             </a:fld>
             <a:endParaRPr lang="en-US"/>
           </a:p>
@@ -12659,6 +12659,35 @@
           </a:p>
         </p:txBody>
       </p:sp>
+      <p:pic>
+        <p:nvPicPr>
+          <p:cNvPr id="4" name="Picture 3"/>
+          <p:cNvPicPr>
+            <a:picLocks noChangeAspect="1"/>
+          </p:cNvPicPr>
+          <p:nvPr/>
+        </p:nvPicPr>
+        <p:blipFill rotWithShape="1">
+          <a:blip r:embed="rId2">
+            <a:extLst>
+              <a:ext uri="{28A0092B-C50C-407E-A947-70E740481C1C}">
+                <a14:useLocalDpi xmlns:a14="http://schemas.microsoft.com/office/drawing/2010/main" val="0"/>
+              </a:ext>
+            </a:extLst>
+          </a:blip>
+          <a:srcRect l="4523" t="17619" r="3095" b="25000"/>
+          <a:stretch/>
+        </p:blipFill>
+        <p:spPr>
+          <a:xfrm>
+            <a:off x="3793356" y="4564606"/>
+            <a:ext cx="1536320" cy="954261"/>
+          </a:xfrm>
+          <a:prstGeom prst="rect">
+            <a:avLst/>
+          </a:prstGeom>
+        </p:spPr>
+      </p:pic>
     </p:spTree>
     <p:extLst>
       <p:ext uri="{BB962C8B-B14F-4D97-AF65-F5344CB8AC3E}">
@@ -13061,11 +13090,7 @@
             </a:r>
             <a:r>
               <a:rPr lang="en-US" b="1" smtClean="0"/>
-              <a:t>in </a:t>
-            </a:r>
-            <a:r>
-              <a:rPr lang="en-US" b="1" smtClean="0"/>
-              <a:t>Advanced)</a:t>
+              <a:t>in Advanced)</a:t>
             </a:r>
             <a:endParaRPr lang="en-US" b="1" dirty="0" smtClean="0"/>
           </a:p>
@@ -13734,7 +13759,7 @@
           <a:effectLst/>
           <a:extLst>
             <a:ext uri="{91240B29-F687-4f45-9708-019B960494DF}">
-              <a14:hiddenLine xmlns:a14="http://schemas.microsoft.com/office/drawing/2010/main" xmlns="" w="9525">
+              <a14:hiddenLine xmlns="" xmlns:a14="http://schemas.microsoft.com/office/drawing/2010/main" w="9525">
                 <a:solidFill>
                   <a:schemeClr val="tx1"/>
                 </a:solidFill>
@@ -13744,7 +13769,7 @@
               </a14:hiddenLine>
             </a:ext>
             <a:ext uri="{AF507438-7753-43e0-B8FC-AC1667EBCBE1}">
-              <a14:hiddenEffects xmlns:a14="http://schemas.microsoft.com/office/drawing/2010/main" xmlns="">
+              <a14:hiddenEffects xmlns="" xmlns:a14="http://schemas.microsoft.com/office/drawing/2010/main">
                 <a:effectLst>
                   <a:outerShdw dist="35921" dir="2700000" algn="ctr" rotWithShape="0">
                     <a:schemeClr val="bg2"/>
@@ -14097,7 +14122,7 @@
           <a:noFill/>
           <a:extLst>
             <a:ext uri="{909E8E84-426E-40dd-AFC4-6F175D3DCCD1}">
-              <a14:hiddenFill xmlns:a14="http://schemas.microsoft.com/office/drawing/2010/main" xmlns="">
+              <a14:hiddenFill xmlns="" xmlns:a14="http://schemas.microsoft.com/office/drawing/2010/main">
                 <a:solidFill>
                   <a:srgbClr val="FFFFFF"/>
                 </a:solidFill>

</xml_diff>